<commit_message>
Atualizando mapa mental, retirada do PWA
</commit_message>
<xml_diff>
--- a/Introdução_Web_Mobile_ok.pptx
+++ b/Introdução_Web_Mobile_ok.pptx
@@ -136,8 +136,8 @@
 <pc:chgInfo xmlns:a="http://schemas.openxmlformats.org/drawingml/2006/main" xmlns:r="http://schemas.openxmlformats.org/officeDocument/2006/relationships" xmlns:ac="http://schemas.microsoft.com/office/drawing/2013/main/command" xmlns:pc="http://schemas.microsoft.com/office/powerpoint/2013/main/command">
   <pc:docChgLst>
     <pc:chgData name="George Luís Costa Ribeiro" userId="65d98055-ae44-4795-8a8e-9d00780538cc" providerId="ADAL" clId="{7117B03E-A60E-4F84-904A-A5490A61D544}"/>
-    <pc:docChg chg="modSld">
-      <pc:chgData name="George Luís Costa Ribeiro" userId="65d98055-ae44-4795-8a8e-9d00780538cc" providerId="ADAL" clId="{7117B03E-A60E-4F84-904A-A5490A61D544}" dt="2022-03-24T02:31:56.236" v="3"/>
+    <pc:docChg chg="custSel modSld">
+      <pc:chgData name="George Luís Costa Ribeiro" userId="65d98055-ae44-4795-8a8e-9d00780538cc" providerId="ADAL" clId="{7117B03E-A60E-4F84-904A-A5490A61D544}" dt="2022-03-24T03:02:07.716" v="7" actId="1076"/>
       <pc:docMkLst>
         <pc:docMk/>
       </pc:docMkLst>
@@ -161,6 +161,29 @@
           <pc:docMk/>
           <pc:sldMk cId="3256434320" sldId="264"/>
         </pc:sldMkLst>
+      </pc:sldChg>
+      <pc:sldChg chg="addSp delSp modSp mod">
+        <pc:chgData name="George Luís Costa Ribeiro" userId="65d98055-ae44-4795-8a8e-9d00780538cc" providerId="ADAL" clId="{7117B03E-A60E-4F84-904A-A5490A61D544}" dt="2022-03-24T03:02:07.716" v="7" actId="1076"/>
+        <pc:sldMkLst>
+          <pc:docMk/>
+          <pc:sldMk cId="2598458061" sldId="265"/>
+        </pc:sldMkLst>
+        <pc:picChg chg="add mod">
+          <ac:chgData name="George Luís Costa Ribeiro" userId="65d98055-ae44-4795-8a8e-9d00780538cc" providerId="ADAL" clId="{7117B03E-A60E-4F84-904A-A5490A61D544}" dt="2022-03-24T03:02:07.716" v="7" actId="1076"/>
+          <ac:picMkLst>
+            <pc:docMk/>
+            <pc:sldMk cId="2598458061" sldId="265"/>
+            <ac:picMk id="3" creationId="{B03500AC-B036-419D-B90F-1533B0A1B087}"/>
+          </ac:picMkLst>
+        </pc:picChg>
+        <pc:picChg chg="del">
+          <ac:chgData name="George Luís Costa Ribeiro" userId="65d98055-ae44-4795-8a8e-9d00780538cc" providerId="ADAL" clId="{7117B03E-A60E-4F84-904A-A5490A61D544}" dt="2022-03-24T03:01:01.258" v="4" actId="478"/>
+          <ac:picMkLst>
+            <pc:docMk/>
+            <pc:sldMk cId="2598458061" sldId="265"/>
+            <ac:picMk id="17" creationId="{49716DB0-4412-4BCB-85D4-0F4DD26A637A}"/>
+          </ac:picMkLst>
+        </pc:picChg>
       </pc:sldChg>
       <pc:sldChg chg="modSp mod">
         <pc:chgData name="George Luís Costa Ribeiro" userId="65d98055-ae44-4795-8a8e-9d00780538cc" providerId="ADAL" clId="{7117B03E-A60E-4F84-904A-A5490A61D544}" dt="2022-03-24T02:31:04.679" v="0" actId="2710"/>
@@ -10785,10 +10808,10 @@
       </p:grpSpPr>
       <p:pic>
         <p:nvPicPr>
-          <p:cNvPr id="17" name="Imagem 16">
-            <a:extLst>
-              <a:ext uri="{FF2B5EF4-FFF2-40B4-BE49-F238E27FC236}">
-                <a16:creationId xmlns:a16="http://schemas.microsoft.com/office/drawing/2014/main" id="{49716DB0-4412-4BCB-85D4-0F4DD26A637A}"/>
+          <p:cNvPr id="3" name="Imagem 2">
+            <a:extLst>
+              <a:ext uri="{FF2B5EF4-FFF2-40B4-BE49-F238E27FC236}">
+                <a16:creationId xmlns:a16="http://schemas.microsoft.com/office/drawing/2014/main" id="{B03500AC-B036-419D-B90F-1533B0A1B087}"/>
               </a:ext>
             </a:extLst>
           </p:cNvPr>
@@ -10798,7 +10821,7 @@
           <p:nvPr/>
         </p:nvPicPr>
         <p:blipFill>
-          <a:blip r:embed="rId2" cstate="print">
+          <a:blip r:embed="rId2">
             <a:extLst>
               <a:ext uri="{28A0092B-C50C-407E-A947-70E740481C1C}">
                 <a14:useLocalDpi xmlns:a14="http://schemas.microsoft.com/office/drawing/2010/main" val="0"/>
@@ -10811,8 +10834,8 @@
         </p:blipFill>
         <p:spPr>
           <a:xfrm>
-            <a:off x="1139577" y="301172"/>
-            <a:ext cx="9912845" cy="6255656"/>
+            <a:off x="1335433" y="167647"/>
+            <a:ext cx="9521133" cy="6522705"/>
           </a:xfrm>
           <a:prstGeom prst="rect">
             <a:avLst/>

</xml_diff>

<commit_message>
Teste das transições de slides (atualizado)
</commit_message>
<xml_diff>
--- a/Introdução_Web_Mobile_ok.pptx
+++ b/Introdução_Web_Mobile_ok.pptx
@@ -7536,6 +7536,9 @@
   <p:clrMapOvr>
     <a:overrideClrMapping bg1="lt1" tx1="dk1" bg2="lt2" tx2="dk2" accent1="accent1" accent2="accent2" accent3="accent3" accent4="accent4" accent5="accent5" accent6="accent6" hlink="hlink" folHlink="folHlink"/>
   </p:clrMapOvr>
+  <p:transition spd="med">
+    <p:pull/>
+  </p:transition>
   <p:timing>
     <p:tnLst>
       <p:par>
@@ -9402,6 +9405,9 @@
               <a:lumOff val="40000"/>
             </a:schemeClr>
           </a:solidFill>
+          <a:ln>
+            <a:noFill/>
+          </a:ln>
         </p:spPr>
         <p:txBody>
           <a:bodyPr wrap="square" lIns="0" tIns="0" rIns="0" bIns="0" rtlCol="0"/>
@@ -9887,6 +9893,9 @@
   <p:clrMapOvr>
     <a:masterClrMapping/>
   </p:clrMapOvr>
+  <p:transition spd="med">
+    <p:pull/>
+  </p:transition>
 </p:sld>
 </file>
 
@@ -9975,6 +9984,9 @@
   <p:clrMapOvr>
     <a:masterClrMapping/>
   </p:clrMapOvr>
+  <p:transition spd="med">
+    <p:pull/>
+  </p:transition>
 </p:sld>
 </file>
 
@@ -10646,6 +10658,9 @@
   <p:clrMapOvr>
     <a:masterClrMapping/>
   </p:clrMapOvr>
+  <p:transition spd="med">
+    <p:pull/>
+  </p:transition>
 </p:sld>
 </file>
 

</xml_diff>